<commit_message>
Report updated as per recent final results
</commit_message>
<xml_diff>
--- a/Reports/Uber_Trip_Analysis_Presentation.pptx
+++ b/Reports/Uber_Trip_Analysis_Presentation.pptx
@@ -307,7 +307,7 @@
           <a:p>
             <a:fld id="{5BCAD085-E8A6-8845-BD4E-CB4CCA059FC4}" type="datetimeFigureOut">
               <a:rPr lang="en-US" smtClean="0"/>
-              <a:t>11/Nov/2025</a:t>
+              <a:t>04/Dec/2025</a:t>
             </a:fld>
             <a:endParaRPr lang="en-US"/>
           </a:p>
@@ -475,7 +475,7 @@
           <a:p>
             <a:fld id="{5BCAD085-E8A6-8845-BD4E-CB4CCA059FC4}" type="datetimeFigureOut">
               <a:rPr lang="en-US" smtClean="0"/>
-              <a:t>11/Nov/2025</a:t>
+              <a:t>04/Dec/2025</a:t>
             </a:fld>
             <a:endParaRPr lang="en-US"/>
           </a:p>
@@ -653,7 +653,7 @@
           <a:p>
             <a:fld id="{5BCAD085-E8A6-8845-BD4E-CB4CCA059FC4}" type="datetimeFigureOut">
               <a:rPr lang="en-US" smtClean="0"/>
-              <a:t>11/Nov/2025</a:t>
+              <a:t>04/Dec/2025</a:t>
             </a:fld>
             <a:endParaRPr lang="en-US"/>
           </a:p>
@@ -821,7 +821,7 @@
           <a:p>
             <a:fld id="{5BCAD085-E8A6-8845-BD4E-CB4CCA059FC4}" type="datetimeFigureOut">
               <a:rPr lang="en-US" smtClean="0"/>
-              <a:t>11/Nov/2025</a:t>
+              <a:t>04/Dec/2025</a:t>
             </a:fld>
             <a:endParaRPr lang="en-US"/>
           </a:p>
@@ -1066,7 +1066,7 @@
           <a:p>
             <a:fld id="{5BCAD085-E8A6-8845-BD4E-CB4CCA059FC4}" type="datetimeFigureOut">
               <a:rPr lang="en-US" smtClean="0"/>
-              <a:t>11/Nov/2025</a:t>
+              <a:t>04/Dec/2025</a:t>
             </a:fld>
             <a:endParaRPr lang="en-US"/>
           </a:p>
@@ -1351,7 +1351,7 @@
           <a:p>
             <a:fld id="{5BCAD085-E8A6-8845-BD4E-CB4CCA059FC4}" type="datetimeFigureOut">
               <a:rPr lang="en-US" smtClean="0"/>
-              <a:t>11/Nov/2025</a:t>
+              <a:t>04/Dec/2025</a:t>
             </a:fld>
             <a:endParaRPr lang="en-US"/>
           </a:p>
@@ -1770,7 +1770,7 @@
           <a:p>
             <a:fld id="{5BCAD085-E8A6-8845-BD4E-CB4CCA059FC4}" type="datetimeFigureOut">
               <a:rPr lang="en-US" smtClean="0"/>
-              <a:t>11/Nov/2025</a:t>
+              <a:t>04/Dec/2025</a:t>
             </a:fld>
             <a:endParaRPr lang="en-US"/>
           </a:p>
@@ -1887,7 +1887,7 @@
           <a:p>
             <a:fld id="{5BCAD085-E8A6-8845-BD4E-CB4CCA059FC4}" type="datetimeFigureOut">
               <a:rPr lang="en-US" smtClean="0"/>
-              <a:t>11/Nov/2025</a:t>
+              <a:t>04/Dec/2025</a:t>
             </a:fld>
             <a:endParaRPr lang="en-US"/>
           </a:p>
@@ -1982,7 +1982,7 @@
           <a:p>
             <a:fld id="{5BCAD085-E8A6-8845-BD4E-CB4CCA059FC4}" type="datetimeFigureOut">
               <a:rPr lang="en-US" smtClean="0"/>
-              <a:t>11/Nov/2025</a:t>
+              <a:t>04/Dec/2025</a:t>
             </a:fld>
             <a:endParaRPr lang="en-US"/>
           </a:p>
@@ -2257,7 +2257,7 @@
           <a:p>
             <a:fld id="{5BCAD085-E8A6-8845-BD4E-CB4CCA059FC4}" type="datetimeFigureOut">
               <a:rPr lang="en-US" smtClean="0"/>
-              <a:t>11/Nov/2025</a:t>
+              <a:t>04/Dec/2025</a:t>
             </a:fld>
             <a:endParaRPr lang="en-US"/>
           </a:p>
@@ -2509,7 +2509,7 @@
           <a:p>
             <a:fld id="{5BCAD085-E8A6-8845-BD4E-CB4CCA059FC4}" type="datetimeFigureOut">
               <a:rPr lang="en-US" smtClean="0"/>
-              <a:t>11/Nov/2025</a:t>
+              <a:t>04/Dec/2025</a:t>
             </a:fld>
             <a:endParaRPr lang="en-US"/>
           </a:p>
@@ -2720,7 +2720,7 @@
           <a:p>
             <a:fld id="{5BCAD085-E8A6-8845-BD4E-CB4CCA059FC4}" type="datetimeFigureOut">
               <a:rPr lang="en-US" smtClean="0"/>
-              <a:t>11/Nov/2025</a:t>
+              <a:t>04/Dec/2025</a:t>
             </a:fld>
             <a:endParaRPr lang="en-US"/>
           </a:p>
@@ -3442,29 +3442,131 @@
             </a:pPr>
             <a:r>
               <a:rPr sz="2800" dirty="0"/>
-              <a:t>Random Forest -&gt; MAPE 9.0</a:t>
+              <a:t>Random Forest -&gt; MAPE</a:t>
             </a:r>
             <a:r>
               <a:rPr lang="en-US" sz="2800" dirty="0"/>
-              <a:t>4</a:t>
+              <a:t>:</a:t>
             </a:r>
             <a:r>
               <a:rPr sz="2800" dirty="0"/>
-              <a:t>%, RMSE 2048.6</a:t>
+              <a:t> </a:t>
+            </a:r>
+            <a:r>
+              <a:rPr lang="en-US" sz="2800" dirty="0">
+                <a:solidFill>
+                  <a:schemeClr val="accent6">
+                    <a:lumMod val="75000"/>
+                  </a:schemeClr>
+                </a:solidFill>
+              </a:rPr>
+              <a:t>8.937</a:t>
+            </a:r>
+            <a:r>
+              <a:rPr sz="2800" dirty="0">
+                <a:solidFill>
+                  <a:schemeClr val="accent6">
+                    <a:lumMod val="75000"/>
+                  </a:schemeClr>
+                </a:solidFill>
+              </a:rPr>
+              <a:t>%</a:t>
+            </a:r>
+            <a:r>
+              <a:rPr sz="2800" dirty="0"/>
+              <a:t>, RMSE</a:t>
             </a:r>
             <a:r>
               <a:rPr lang="en-US" sz="2800" dirty="0"/>
-              <a:t>7</a:t>
+              <a:t>:</a:t>
             </a:r>
             <a:r>
               <a:rPr sz="2800" dirty="0"/>
-              <a:t>, R^2 0.96</a:t>
+              <a:t> </a:t>
+            </a:r>
+            <a:r>
+              <a:rPr sz="2800" dirty="0">
+                <a:solidFill>
+                  <a:schemeClr val="accent6">
+                    <a:lumMod val="75000"/>
+                  </a:schemeClr>
+                </a:solidFill>
+              </a:rPr>
+              <a:t>20</a:t>
+            </a:r>
+            <a:r>
+              <a:rPr lang="en-US" sz="2800" dirty="0">
+                <a:solidFill>
+                  <a:schemeClr val="accent6">
+                    <a:lumMod val="75000"/>
+                  </a:schemeClr>
+                </a:solidFill>
+              </a:rPr>
+              <a:t>70</a:t>
+            </a:r>
+            <a:r>
+              <a:rPr sz="2800" dirty="0">
+                <a:solidFill>
+                  <a:schemeClr val="accent6">
+                    <a:lumMod val="75000"/>
+                  </a:schemeClr>
+                </a:solidFill>
+              </a:rPr>
+              <a:t>.6</a:t>
+            </a:r>
+            <a:r>
+              <a:rPr lang="en-US" sz="2800" dirty="0">
+                <a:solidFill>
+                  <a:schemeClr val="accent6">
+                    <a:lumMod val="75000"/>
+                  </a:schemeClr>
+                </a:solidFill>
+              </a:rPr>
+              <a:t>8</a:t>
+            </a:r>
+            <a:r>
+              <a:rPr sz="2800" dirty="0"/>
+              <a:t>, R</a:t>
             </a:r>
             <a:r>
               <a:rPr lang="en-US" sz="2800" dirty="0"/>
+              <a:t>2:</a:t>
+            </a:r>
+            <a:r>
+              <a:rPr sz="2800" dirty="0"/>
+              <a:t> </a:t>
+            </a:r>
+            <a:r>
+              <a:rPr sz="2800" dirty="0">
+                <a:solidFill>
+                  <a:schemeClr val="accent6">
+                    <a:lumMod val="75000"/>
+                  </a:schemeClr>
+                </a:solidFill>
+              </a:rPr>
+              <a:t>0.96</a:t>
+            </a:r>
+            <a:r>
+              <a:rPr lang="en-US" sz="2800" dirty="0">
+                <a:solidFill>
+                  <a:schemeClr val="accent6">
+                    <a:lumMod val="75000"/>
+                  </a:schemeClr>
+                </a:solidFill>
+              </a:rPr>
               <a:t>6</a:t>
             </a:r>
-            <a:endParaRPr sz="2800" dirty="0"/>
+            <a:r>
+              <a:rPr lang="en-US" sz="2800" dirty="0"/>
+              <a:t>.</a:t>
+            </a:r>
+            <a:endParaRPr sz="2800" dirty="0">
+              <a:solidFill>
+                <a:schemeClr val="accent6">
+                  <a:lumMod val="75000"/>
+                </a:schemeClr>
+              </a:solidFill>
+            </a:endParaRPr>
           </a:p>
           <a:p>
             <a:r>
@@ -3473,39 +3575,216 @@
             </a:r>
             <a:r>
               <a:rPr sz="2800" dirty="0"/>
-              <a:t> -&gt; MAPE 8.72%, RMSE 1798.</a:t>
+              <a:t> -&gt; MAPE</a:t>
             </a:r>
             <a:r>
               <a:rPr lang="en-US" sz="2800" dirty="0"/>
-              <a:t>09</a:t>
+              <a:t>:</a:t>
             </a:r>
             <a:r>
               <a:rPr sz="2800" dirty="0"/>
-              <a:t>, R^</a:t>
-            </a:r>
-            <a:r>
-              <a:rPr sz="2800"/>
-              <a:t>2 0.97</a:t>
-            </a:r>
-            <a:r>
-              <a:rPr lang="en-US" sz="2800"/>
-              <a:t>4</a:t>
-            </a:r>
-            <a:endParaRPr sz="2800" dirty="0"/>
-          </a:p>
-          <a:p>
+              <a:t> </a:t>
+            </a:r>
+            <a:r>
+              <a:rPr sz="2800" dirty="0">
+                <a:solidFill>
+                  <a:schemeClr val="accent6">
+                    <a:lumMod val="75000"/>
+                  </a:schemeClr>
+                </a:solidFill>
+              </a:rPr>
+              <a:t>8.72</a:t>
+            </a:r>
+            <a:r>
+              <a:rPr lang="en-US" sz="2800" dirty="0">
+                <a:solidFill>
+                  <a:schemeClr val="accent6">
+                    <a:lumMod val="75000"/>
+                  </a:schemeClr>
+                </a:solidFill>
+              </a:rPr>
+              <a:t>5</a:t>
+            </a:r>
+            <a:r>
+              <a:rPr sz="2800" dirty="0">
+                <a:solidFill>
+                  <a:schemeClr val="accent6">
+                    <a:lumMod val="75000"/>
+                  </a:schemeClr>
+                </a:solidFill>
+              </a:rPr>
+              <a:t>%</a:t>
+            </a:r>
             <a:r>
               <a:rPr sz="2800" dirty="0"/>
-              <a:t>Gradient Boosting -&gt; MAPE 7.67%, RMSE 1505.9</a:t>
+              <a:t>, RMSE</a:t>
             </a:r>
             <a:r>
               <a:rPr lang="en-US" sz="2800" dirty="0"/>
-              <a:t>3</a:t>
+              <a:t>:</a:t>
             </a:r>
             <a:r>
               <a:rPr sz="2800" dirty="0"/>
-              <a:t>, R^2 0.982</a:t>
-            </a:r>
+              <a:t> </a:t>
+            </a:r>
+            <a:r>
+              <a:rPr sz="2800" dirty="0">
+                <a:solidFill>
+                  <a:schemeClr val="accent6">
+                    <a:lumMod val="75000"/>
+                  </a:schemeClr>
+                </a:solidFill>
+              </a:rPr>
+              <a:t>1798.</a:t>
+            </a:r>
+            <a:r>
+              <a:rPr lang="en-US" sz="2800" dirty="0">
+                <a:solidFill>
+                  <a:schemeClr val="accent6">
+                    <a:lumMod val="75000"/>
+                  </a:schemeClr>
+                </a:solidFill>
+              </a:rPr>
+              <a:t>10</a:t>
+            </a:r>
+            <a:r>
+              <a:rPr sz="2800" dirty="0"/>
+              <a:t>, R2</a:t>
+            </a:r>
+            <a:r>
+              <a:rPr lang="en-US" sz="2800" dirty="0"/>
+              <a:t>:</a:t>
+            </a:r>
+            <a:r>
+              <a:rPr sz="2800" dirty="0"/>
+              <a:t> </a:t>
+            </a:r>
+            <a:r>
+              <a:rPr sz="2800" dirty="0">
+                <a:solidFill>
+                  <a:schemeClr val="accent6">
+                    <a:lumMod val="75000"/>
+                  </a:schemeClr>
+                </a:solidFill>
+              </a:rPr>
+              <a:t>0.97</a:t>
+            </a:r>
+            <a:r>
+              <a:rPr lang="en-US" sz="2800" dirty="0">
+                <a:solidFill>
+                  <a:schemeClr val="accent6">
+                    <a:lumMod val="75000"/>
+                  </a:schemeClr>
+                </a:solidFill>
+              </a:rPr>
+              <a:t>5</a:t>
+            </a:r>
+            <a:endParaRPr sz="2800" dirty="0">
+              <a:solidFill>
+                <a:schemeClr val="accent6">
+                  <a:lumMod val="75000"/>
+                </a:schemeClr>
+              </a:solidFill>
+            </a:endParaRPr>
+          </a:p>
+          <a:p>
+            <a:r>
+              <a:rPr sz="2800" dirty="0"/>
+              <a:t>Gradient Boosting -&gt; MAPE</a:t>
+            </a:r>
+            <a:r>
+              <a:rPr lang="en-US" sz="2800" dirty="0"/>
+              <a:t>:</a:t>
+            </a:r>
+            <a:r>
+              <a:rPr sz="2800" dirty="0"/>
+              <a:t> </a:t>
+            </a:r>
+            <a:r>
+              <a:rPr sz="2800" dirty="0">
+                <a:solidFill>
+                  <a:schemeClr val="accent3"/>
+                </a:solidFill>
+              </a:rPr>
+              <a:t>7.</a:t>
+            </a:r>
+            <a:r>
+              <a:rPr lang="en-US" sz="2800" dirty="0">
+                <a:solidFill>
+                  <a:schemeClr val="accent3"/>
+                </a:solidFill>
+              </a:rPr>
+              <a:t>139</a:t>
+            </a:r>
+            <a:r>
+              <a:rPr sz="2800" dirty="0">
+                <a:solidFill>
+                  <a:schemeClr val="accent3"/>
+                </a:solidFill>
+              </a:rPr>
+              <a:t>%</a:t>
+            </a:r>
+            <a:r>
+              <a:rPr sz="2800" dirty="0"/>
+              <a:t>, RMSE</a:t>
+            </a:r>
+            <a:r>
+              <a:rPr lang="en-US" sz="2800" dirty="0"/>
+              <a:t>:</a:t>
+            </a:r>
+            <a:r>
+              <a:rPr sz="2800" dirty="0"/>
+              <a:t> </a:t>
+            </a:r>
+            <a:r>
+              <a:rPr sz="2800" dirty="0">
+                <a:solidFill>
+                  <a:schemeClr val="accent3"/>
+                </a:solidFill>
+              </a:rPr>
+              <a:t>1</a:t>
+            </a:r>
+            <a:r>
+              <a:rPr lang="en-US" sz="2800" dirty="0">
+                <a:solidFill>
+                  <a:schemeClr val="accent3"/>
+                </a:solidFill>
+              </a:rPr>
+              <a:t>454.74</a:t>
+            </a:r>
+            <a:r>
+              <a:rPr sz="2800" dirty="0"/>
+              <a:t>, R2</a:t>
+            </a:r>
+            <a:r>
+              <a:rPr lang="en-US" sz="2800" dirty="0"/>
+              <a:t>:</a:t>
+            </a:r>
+            <a:r>
+              <a:rPr sz="2800" dirty="0"/>
+              <a:t> </a:t>
+            </a:r>
+            <a:r>
+              <a:rPr sz="2800">
+                <a:solidFill>
+                  <a:schemeClr val="accent3"/>
+                </a:solidFill>
+              </a:rPr>
+              <a:t>0.98</a:t>
+            </a:r>
+            <a:r>
+              <a:rPr lang="en-US" sz="2800">
+                <a:solidFill>
+                  <a:schemeClr val="accent3"/>
+                </a:solidFill>
+              </a:rPr>
+              <a:t>3.</a:t>
+            </a:r>
+            <a:endParaRPr sz="2800" dirty="0">
+              <a:solidFill>
+                <a:schemeClr val="accent3"/>
+              </a:solidFill>
+            </a:endParaRPr>
           </a:p>
           <a:p>
             <a:r>

</xml_diff>